<commit_message>
Created script to analyze 24B and Hand knockdown of Tsc1, part of issue #24
</commit_message>
<xml_diff>
--- a/Manuscripts/Muscle Tsc1 Aging Paper/Data Summary.pptx
+++ b/Manuscripts/Muscle Tsc1 Aging Paper/Data Summary.pptx
@@ -9,8 +9,9 @@
     <p:sldId id="259" r:id="rId3"/>
     <p:sldId id="257" r:id="rId4"/>
     <p:sldId id="260" r:id="rId5"/>
-    <p:sldId id="258" r:id="rId6"/>
-    <p:sldId id="261" r:id="rId7"/>
+    <p:sldId id="262" r:id="rId6"/>
+    <p:sldId id="258" r:id="rId7"/>
+    <p:sldId id="261" r:id="rId8"/>
   </p:sldIdLst>
   <p:sldSz cx="9144000" cy="6858000" type="screen4x3"/>
   <p:notesSz cx="6858000" cy="9144000"/>
@@ -293,7 +294,7 @@
           <a:p>
             <a:fld id="{1DBAFFBE-1D8E-E243-8BC7-52F01614342D}" type="datetimeFigureOut">
               <a:rPr lang="en-US" smtClean="0"/>
-              <a:t>2/10/16</a:t>
+              <a:t>2/11/16</a:t>
             </a:fld>
             <a:endParaRPr lang="en-US"/>
           </a:p>
@@ -463,7 +464,7 @@
           <a:p>
             <a:fld id="{1DBAFFBE-1D8E-E243-8BC7-52F01614342D}" type="datetimeFigureOut">
               <a:rPr lang="en-US" smtClean="0"/>
-              <a:t>2/10/16</a:t>
+              <a:t>2/11/16</a:t>
             </a:fld>
             <a:endParaRPr lang="en-US"/>
           </a:p>
@@ -643,7 +644,7 @@
           <a:p>
             <a:fld id="{1DBAFFBE-1D8E-E243-8BC7-52F01614342D}" type="datetimeFigureOut">
               <a:rPr lang="en-US" smtClean="0"/>
-              <a:t>2/10/16</a:t>
+              <a:t>2/11/16</a:t>
             </a:fld>
             <a:endParaRPr lang="en-US"/>
           </a:p>
@@ -813,7 +814,7 @@
           <a:p>
             <a:fld id="{1DBAFFBE-1D8E-E243-8BC7-52F01614342D}" type="datetimeFigureOut">
               <a:rPr lang="en-US" smtClean="0"/>
-              <a:t>2/10/16</a:t>
+              <a:t>2/11/16</a:t>
             </a:fld>
             <a:endParaRPr lang="en-US"/>
           </a:p>
@@ -1059,7 +1060,7 @@
           <a:p>
             <a:fld id="{1DBAFFBE-1D8E-E243-8BC7-52F01614342D}" type="datetimeFigureOut">
               <a:rPr lang="en-US" smtClean="0"/>
-              <a:t>2/10/16</a:t>
+              <a:t>2/11/16</a:t>
             </a:fld>
             <a:endParaRPr lang="en-US"/>
           </a:p>
@@ -1347,7 +1348,7 @@
           <a:p>
             <a:fld id="{1DBAFFBE-1D8E-E243-8BC7-52F01614342D}" type="datetimeFigureOut">
               <a:rPr lang="en-US" smtClean="0"/>
-              <a:t>2/10/16</a:t>
+              <a:t>2/11/16</a:t>
             </a:fld>
             <a:endParaRPr lang="en-US"/>
           </a:p>
@@ -1769,7 +1770,7 @@
           <a:p>
             <a:fld id="{1DBAFFBE-1D8E-E243-8BC7-52F01614342D}" type="datetimeFigureOut">
               <a:rPr lang="en-US" smtClean="0"/>
-              <a:t>2/10/16</a:t>
+              <a:t>2/11/16</a:t>
             </a:fld>
             <a:endParaRPr lang="en-US"/>
           </a:p>
@@ -1887,7 +1888,7 @@
           <a:p>
             <a:fld id="{1DBAFFBE-1D8E-E243-8BC7-52F01614342D}" type="datetimeFigureOut">
               <a:rPr lang="en-US" smtClean="0"/>
-              <a:t>2/10/16</a:t>
+              <a:t>2/11/16</a:t>
             </a:fld>
             <a:endParaRPr lang="en-US"/>
           </a:p>
@@ -1982,7 +1983,7 @@
           <a:p>
             <a:fld id="{1DBAFFBE-1D8E-E243-8BC7-52F01614342D}" type="datetimeFigureOut">
               <a:rPr lang="en-US" smtClean="0"/>
-              <a:t>2/10/16</a:t>
+              <a:t>2/11/16</a:t>
             </a:fld>
             <a:endParaRPr lang="en-US"/>
           </a:p>
@@ -2259,7 +2260,7 @@
           <a:p>
             <a:fld id="{1DBAFFBE-1D8E-E243-8BC7-52F01614342D}" type="datetimeFigureOut">
               <a:rPr lang="en-US" smtClean="0"/>
-              <a:t>2/10/16</a:t>
+              <a:t>2/11/16</a:t>
             </a:fld>
             <a:endParaRPr lang="en-US"/>
           </a:p>
@@ -2512,7 +2513,7 @@
           <a:p>
             <a:fld id="{1DBAFFBE-1D8E-E243-8BC7-52F01614342D}" type="datetimeFigureOut">
               <a:rPr lang="en-US" smtClean="0"/>
-              <a:t>2/10/16</a:t>
+              <a:t>2/11/16</a:t>
             </a:fld>
             <a:endParaRPr lang="en-US"/>
           </a:p>
@@ -2725,7 +2726,7 @@
           <a:p>
             <a:fld id="{1DBAFFBE-1D8E-E243-8BC7-52F01614342D}" type="datetimeFigureOut">
               <a:rPr lang="en-US" smtClean="0"/>
-              <a:t>2/10/16</a:t>
+              <a:t>2/11/16</a:t>
             </a:fld>
             <a:endParaRPr lang="en-US"/>
           </a:p>
@@ -3472,7 +3473,19 @@
             </a:r>
             <a:r>
               <a:rPr lang="en-US" dirty="0" smtClean="0"/>
-              <a:t> in Fly Muscles Shortens Lifespan</a:t>
+              <a:t> in Fly </a:t>
+            </a:r>
+            <a:r>
+              <a:rPr lang="en-US" dirty="0" smtClean="0"/>
+              <a:t>Flight </a:t>
+            </a:r>
+            <a:r>
+              <a:rPr lang="en-US" dirty="0" smtClean="0"/>
+              <a:t>Muscles </a:t>
+            </a:r>
+            <a:r>
+              <a:rPr lang="en-US" dirty="0" smtClean="0"/>
+              <a:t>Shortens Lifespan</a:t>
             </a:r>
             <a:endParaRPr lang="en-US" dirty="0"/>
           </a:p>
@@ -3501,19 +3514,105 @@
           <a:p>
             <a:r>
               <a:rPr lang="en-US" dirty="0" smtClean="0"/>
-              <a:t>24B and Hand-</a:t>
-            </a:r>
-            <a:r>
-              <a:rPr lang="en-US" smtClean="0"/>
-              <a:t>Gal4 drivers</a:t>
-            </a:r>
-            <a:endParaRPr lang="en-US" dirty="0" smtClean="0"/>
-          </a:p>
-          <a:p>
+              <a:t>24B </a:t>
+            </a:r>
+            <a:r>
+              <a:rPr lang="en-US" dirty="0" smtClean="0"/>
+              <a:t>Driver</a:t>
+            </a:r>
+          </a:p>
+          <a:p>
+            <a:r>
+              <a:rPr lang="en-US" dirty="0" smtClean="0"/>
+              <a:t>2/3 </a:t>
+            </a:r>
+            <a:r>
+              <a:rPr lang="en-US" dirty="0" err="1" smtClean="0"/>
+              <a:t>shRNA</a:t>
+            </a:r>
+            <a:r>
+              <a:rPr lang="en-US" dirty="0" smtClean="0"/>
+              <a:t> for Tsc</a:t>
+            </a:r>
+            <a:r>
+              <a:rPr lang="en-US" dirty="0" smtClean="0"/>
+              <a:t>1 caused reduced lifespan</a:t>
+            </a:r>
+          </a:p>
+          <a:p>
+            <a:r>
+              <a:rPr lang="en-US" dirty="0" smtClean="0"/>
+              <a:t>True for both genders</a:t>
+            </a:r>
+          </a:p>
+          <a:p>
+            <a:pPr marL="0" indent="0">
+              <a:buNone/>
+            </a:pPr>
             <a:endParaRPr lang="en-US" dirty="0"/>
           </a:p>
         </p:txBody>
       </p:sp>
+      <p:pic>
+        <p:nvPicPr>
+          <p:cNvPr id="6" name="Picture 5" descr="survival-analysis-24b-by-UAS-1.png"/>
+          <p:cNvPicPr>
+            <a:picLocks noChangeAspect="1"/>
+          </p:cNvPicPr>
+          <p:nvPr/>
+        </p:nvPicPr>
+        <p:blipFill>
+          <a:blip r:embed="rId2">
+            <a:extLst>
+              <a:ext uri="{28A0092B-C50C-407E-A947-70E740481C1C}">
+                <a14:useLocalDpi xmlns:a14="http://schemas.microsoft.com/office/drawing/2010/main" val="0"/>
+              </a:ext>
+            </a:extLst>
+          </a:blip>
+          <a:stretch>
+            <a:fillRect/>
+          </a:stretch>
+        </p:blipFill>
+        <p:spPr>
+          <a:xfrm>
+            <a:off x="84603" y="1297235"/>
+            <a:ext cx="4068723" cy="2906231"/>
+          </a:xfrm>
+          <a:prstGeom prst="rect">
+            <a:avLst/>
+          </a:prstGeom>
+        </p:spPr>
+      </p:pic>
+      <p:pic>
+        <p:nvPicPr>
+          <p:cNvPr id="9" name="Picture 8" descr="survival-analysis-24b-by-UAS-3.png"/>
+          <p:cNvPicPr>
+            <a:picLocks noChangeAspect="1"/>
+          </p:cNvPicPr>
+          <p:nvPr/>
+        </p:nvPicPr>
+        <p:blipFill>
+          <a:blip r:embed="rId3">
+            <a:extLst>
+              <a:ext uri="{28A0092B-C50C-407E-A947-70E740481C1C}">
+                <a14:useLocalDpi xmlns:a14="http://schemas.microsoft.com/office/drawing/2010/main" val="0"/>
+              </a:ext>
+            </a:extLst>
+          </a:blip>
+          <a:stretch>
+            <a:fillRect/>
+          </a:stretch>
+        </p:blipFill>
+        <p:spPr>
+          <a:xfrm>
+            <a:off x="161126" y="4006429"/>
+            <a:ext cx="3992200" cy="2851571"/>
+          </a:xfrm>
+          <a:prstGeom prst="rect">
+            <a:avLst/>
+          </a:prstGeom>
+        </p:spPr>
+      </p:pic>
     </p:spTree>
     <p:extLst>
       <p:ext uri="{BB962C8B-B14F-4D97-AF65-F5344CB8AC3E}">
@@ -3535,6 +3634,166 @@
 </file>
 
 <file path=ppt/slides/slide5.xml><?xml version="1.0" encoding="utf-8"?>
+<p:sld xmlns:a="http://schemas.openxmlformats.org/drawingml/2006/main" xmlns:r="http://schemas.openxmlformats.org/officeDocument/2006/relationships" xmlns:p="http://schemas.openxmlformats.org/presentationml/2006/main">
+  <p:cSld>
+    <p:spTree>
+      <p:nvGrpSpPr>
+        <p:cNvPr id="1" name=""/>
+        <p:cNvGrpSpPr/>
+        <p:nvPr/>
+      </p:nvGrpSpPr>
+      <p:grpSpPr>
+        <a:xfrm>
+          <a:off x="0" y="0"/>
+          <a:ext cx="0" cy="0"/>
+          <a:chOff x="0" y="0"/>
+          <a:chExt cx="0" cy="0"/>
+        </a:xfrm>
+      </p:grpSpPr>
+      <p:sp>
+        <p:nvSpPr>
+          <p:cNvPr id="2" name="Title 1"/>
+          <p:cNvSpPr>
+            <a:spLocks noGrp="1"/>
+          </p:cNvSpPr>
+          <p:nvPr>
+            <p:ph type="title"/>
+          </p:nvPr>
+        </p:nvSpPr>
+        <p:spPr/>
+        <p:txBody>
+          <a:bodyPr/>
+          <a:lstStyle/>
+          <a:p>
+            <a:r>
+              <a:rPr lang="en-US" dirty="0" smtClean="0"/>
+              <a:t>No Effect of Cardiac </a:t>
+            </a:r>
+            <a:r>
+              <a:rPr lang="en-US" dirty="0" err="1" smtClean="0"/>
+              <a:t>Tsc</a:t>
+            </a:r>
+            <a:r>
+              <a:rPr lang="en-US" dirty="0" smtClean="0"/>
+              <a:t> Knockout</a:t>
+            </a:r>
+            <a:endParaRPr lang="en-US" dirty="0"/>
+          </a:p>
+        </p:txBody>
+      </p:sp>
+      <p:sp>
+        <p:nvSpPr>
+          <p:cNvPr id="4" name="Content Placeholder 3"/>
+          <p:cNvSpPr>
+            <a:spLocks noGrp="1"/>
+          </p:cNvSpPr>
+          <p:nvPr>
+            <p:ph sz="half" idx="2"/>
+          </p:nvPr>
+        </p:nvSpPr>
+        <p:spPr/>
+        <p:txBody>
+          <a:bodyPr/>
+          <a:lstStyle/>
+          <a:p>
+            <a:r>
+              <a:rPr lang="en-US" dirty="0" smtClean="0"/>
+              <a:t>Used Hand-Gal4 driver</a:t>
+            </a:r>
+          </a:p>
+          <a:p>
+            <a:r>
+              <a:rPr lang="en-US" dirty="0" smtClean="0"/>
+              <a:t>No effect on males or females</a:t>
+            </a:r>
+          </a:p>
+          <a:p>
+            <a:r>
+              <a:rPr lang="en-US" dirty="0" smtClean="0"/>
+              <a:t>Only tested one </a:t>
+            </a:r>
+            <a:r>
+              <a:rPr lang="en-US" dirty="0" err="1" smtClean="0"/>
+              <a:t>shRNA</a:t>
+            </a:r>
+            <a:endParaRPr lang="en-US" dirty="0"/>
+          </a:p>
+        </p:txBody>
+      </p:sp>
+      <p:pic>
+        <p:nvPicPr>
+          <p:cNvPr id="7" name="Picture 6" descr="survival-analysis-hand-by-UAS-1.png"/>
+          <p:cNvPicPr>
+            <a:picLocks noChangeAspect="1"/>
+          </p:cNvPicPr>
+          <p:nvPr/>
+        </p:nvPicPr>
+        <p:blipFill>
+          <a:blip r:embed="rId2">
+            <a:extLst>
+              <a:ext uri="{28A0092B-C50C-407E-A947-70E740481C1C}">
+                <a14:useLocalDpi xmlns:a14="http://schemas.microsoft.com/office/drawing/2010/main" val="0"/>
+              </a:ext>
+            </a:extLst>
+          </a:blip>
+          <a:stretch>
+            <a:fillRect/>
+          </a:stretch>
+        </p:blipFill>
+        <p:spPr>
+          <a:xfrm>
+            <a:off x="0" y="972212"/>
+            <a:ext cx="4994379" cy="3567414"/>
+          </a:xfrm>
+          <a:prstGeom prst="rect">
+            <a:avLst/>
+          </a:prstGeom>
+        </p:spPr>
+      </p:pic>
+      <p:pic>
+        <p:nvPicPr>
+          <p:cNvPr id="9" name="Picture 8" descr="survival-analysis-hand-by-UAS-3.png"/>
+          <p:cNvPicPr>
+            <a:picLocks noChangeAspect="1"/>
+          </p:cNvPicPr>
+          <p:nvPr/>
+        </p:nvPicPr>
+        <p:blipFill>
+          <a:blip r:embed="rId3">
+            <a:extLst>
+              <a:ext uri="{28A0092B-C50C-407E-A947-70E740481C1C}">
+                <a14:useLocalDpi xmlns:a14="http://schemas.microsoft.com/office/drawing/2010/main" val="0"/>
+              </a:ext>
+            </a:extLst>
+          </a:blip>
+          <a:stretch>
+            <a:fillRect/>
+          </a:stretch>
+        </p:blipFill>
+        <p:spPr>
+          <a:xfrm>
+            <a:off x="703631" y="4141572"/>
+            <a:ext cx="3802998" cy="2716427"/>
+          </a:xfrm>
+          <a:prstGeom prst="rect">
+            <a:avLst/>
+          </a:prstGeom>
+        </p:spPr>
+      </p:pic>
+    </p:spTree>
+    <p:extLst>
+      <p:ext uri="{BB962C8B-B14F-4D97-AF65-F5344CB8AC3E}">
+        <p14:creationId xmlns:p14="http://schemas.microsoft.com/office/powerpoint/2010/main" val="572049767"/>
+      </p:ext>
+    </p:extLst>
+  </p:cSld>
+  <p:clrMapOvr>
+    <a:masterClrMapping/>
+  </p:clrMapOvr>
+</p:sld>
+</file>
+
+<file path=ppt/slides/slide6.xml><?xml version="1.0" encoding="utf-8"?>
 <p:sld xmlns:a="http://schemas.openxmlformats.org/drawingml/2006/main" xmlns:r="http://schemas.openxmlformats.org/officeDocument/2006/relationships" xmlns:p="http://schemas.openxmlformats.org/presentationml/2006/main">
   <p:cSld>
     <p:spTree>
@@ -3765,10 +4024,17 @@
   <p:clrMapOvr>
     <a:masterClrMapping/>
   </p:clrMapOvr>
+  <p:timing>
+    <p:tnLst>
+      <p:par>
+        <p:cTn xmlns:p14="http://schemas.microsoft.com/office/powerpoint/2010/main" id="1" dur="indefinite" restart="never" nodeType="tmRoot"/>
+      </p:par>
+    </p:tnLst>
+  </p:timing>
 </p:sld>
 </file>
 
-<file path=ppt/slides/slide6.xml><?xml version="1.0" encoding="utf-8"?>
+<file path=ppt/slides/slide7.xml><?xml version="1.0" encoding="utf-8"?>
 <p:sld xmlns:a="http://schemas.openxmlformats.org/drawingml/2006/main" xmlns:r="http://schemas.openxmlformats.org/officeDocument/2006/relationships" xmlns:p="http://schemas.openxmlformats.org/presentationml/2006/main">
   <p:cSld>
     <p:spTree>
@@ -3823,9 +4089,19 @@
         <p:spPr/>
         <p:txBody>
           <a:bodyPr>
-            <a:normAutofit fontScale="92500" lnSpcReduction="10000"/>
+            <a:normAutofit fontScale="85000" lnSpcReduction="10000"/>
           </a:bodyPr>
           <a:lstStyle/>
+          <a:p>
+            <a:r>
+              <a:rPr lang="en-US" dirty="0" smtClean="0"/>
+              <a:t>This is genetic impairment of autophagy in </a:t>
+            </a:r>
+            <a:r>
+              <a:rPr lang="en-US" smtClean="0"/>
+              <a:t>skeletal muscles</a:t>
+            </a:r>
+          </a:p>
           <a:p>
             <a:r>
               <a:rPr lang="en-US" dirty="0" smtClean="0"/>

</xml_diff>

<commit_message>
Added fly tsc data to outline, part of issue #24
</commit_message>
<xml_diff>
--- a/Manuscripts/Muscle Tsc1 Aging Paper/Data Summary.pptx
+++ b/Manuscripts/Muscle Tsc1 Aging Paper/Data Summary.pptx
@@ -12,6 +12,7 @@
     <p:sldId id="262" r:id="rId6"/>
     <p:sldId id="258" r:id="rId7"/>
     <p:sldId id="261" r:id="rId8"/>
+    <p:sldId id="263" r:id="rId9"/>
   </p:sldIdLst>
   <p:sldSz cx="9144000" cy="6858000" type="screen4x3"/>
   <p:notesSz cx="6858000" cy="9144000"/>
@@ -3503,7 +3504,9 @@
         </p:nvSpPr>
         <p:spPr/>
         <p:txBody>
-          <a:bodyPr/>
+          <a:bodyPr>
+            <a:normAutofit fontScale="85000" lnSpcReduction="10000"/>
+          </a:bodyPr>
           <a:lstStyle/>
           <a:p>
             <a:r>
@@ -3532,18 +3535,71 @@
             </a:r>
             <a:r>
               <a:rPr lang="en-US" dirty="0" smtClean="0"/>
-              <a:t> for Tsc</a:t>
-            </a:r>
-            <a:r>
-              <a:rPr lang="en-US" dirty="0" smtClean="0"/>
-              <a:t>1 caused reduced lifespan</a:t>
-            </a:r>
-          </a:p>
-          <a:p>
-            <a:r>
-              <a:rPr lang="en-US" dirty="0" smtClean="0"/>
-              <a:t>True for both genders</a:t>
-            </a:r>
+              <a:t> for </a:t>
+            </a:r>
+            <a:r>
+              <a:rPr lang="en-US" i="1" dirty="0" smtClean="0"/>
+              <a:t>Tsc</a:t>
+            </a:r>
+            <a:r>
+              <a:rPr lang="en-US" i="1" dirty="0" smtClean="0"/>
+              <a:t>1</a:t>
+            </a:r>
+            <a:r>
+              <a:rPr lang="en-US" dirty="0" smtClean="0"/>
+              <a:t> caused reduced lifespan</a:t>
+            </a:r>
+          </a:p>
+          <a:p>
+            <a:r>
+              <a:rPr lang="en-US" dirty="0" smtClean="0"/>
+              <a:t>Hazard ratios are 3.5X and 2.2X for two </a:t>
+            </a:r>
+            <a:r>
+              <a:rPr lang="en-US" dirty="0" err="1" smtClean="0"/>
+              <a:t>shRNAs</a:t>
+            </a:r>
+            <a:r>
+              <a:rPr lang="en-US" dirty="0" smtClean="0"/>
+              <a:t> (p&lt;1x10</a:t>
+            </a:r>
+            <a:r>
+              <a:rPr lang="en-US" baseline="30000" dirty="0" smtClean="0"/>
+              <a:t>-5</a:t>
+            </a:r>
+            <a:r>
+              <a:rPr lang="en-US" dirty="0" smtClean="0"/>
+              <a:t>)</a:t>
+            </a:r>
+          </a:p>
+          <a:p>
+            <a:r>
+              <a:rPr lang="en-US" dirty="0" smtClean="0"/>
+              <a:t>True for both genders for both </a:t>
+            </a:r>
+            <a:r>
+              <a:rPr lang="en-US" dirty="0" err="1" smtClean="0"/>
+              <a:t>shRNA</a:t>
+            </a:r>
+            <a:r>
+              <a:rPr lang="en-US" dirty="0" smtClean="0"/>
+              <a:t> that had effect</a:t>
+            </a:r>
+          </a:p>
+          <a:p>
+            <a:r>
+              <a:rPr lang="en-US" dirty="0" smtClean="0"/>
+              <a:t>Third </a:t>
+            </a:r>
+            <a:r>
+              <a:rPr lang="en-US" dirty="0" err="1" smtClean="0"/>
+              <a:t>shRNA</a:t>
+            </a:r>
+            <a:r>
+              <a:rPr lang="en-US" dirty="0" smtClean="0"/>
+              <a:t> probably nonfunctional (no phenotype with SSI assay)</a:t>
+            </a:r>
+            <a:endParaRPr lang="en-US" dirty="0" smtClean="0"/>
           </a:p>
           <a:p>
             <a:pPr marL="0" indent="0">
@@ -3670,8 +3726,8 @@
               <a:t>No Effect of Cardiac </a:t>
             </a:r>
             <a:r>
-              <a:rPr lang="en-US" dirty="0" err="1" smtClean="0"/>
-              <a:t>Tsc</a:t>
+              <a:rPr lang="en-US" i="1" dirty="0" smtClean="0"/>
+              <a:t>Tsc1</a:t>
             </a:r>
             <a:r>
               <a:rPr lang="en-US" dirty="0" smtClean="0"/>
@@ -3698,7 +3754,23 @@
           <a:p>
             <a:r>
               <a:rPr lang="en-US" dirty="0" smtClean="0"/>
-              <a:t>Used Hand-Gal4 driver</a:t>
+              <a:t>Used </a:t>
+            </a:r>
+            <a:r>
+              <a:rPr lang="en-US" i="1" dirty="0" smtClean="0"/>
+              <a:t>Hand</a:t>
+            </a:r>
+            <a:r>
+              <a:rPr lang="en-US" dirty="0" smtClean="0"/>
+              <a:t>-</a:t>
+            </a:r>
+            <a:r>
+              <a:rPr lang="en-US" i="1" dirty="0" smtClean="0"/>
+              <a:t>Gal4</a:t>
+            </a:r>
+            <a:r>
+              <a:rPr lang="en-US" dirty="0" smtClean="0"/>
+              <a:t> driver</a:t>
             </a:r>
           </a:p>
           <a:p>
@@ -3716,7 +3788,18 @@
               <a:rPr lang="en-US" dirty="0" err="1" smtClean="0"/>
               <a:t>shRNA</a:t>
             </a:r>
-            <a:endParaRPr lang="en-US" dirty="0"/>
+            <a:r>
+              <a:rPr lang="en-US" dirty="0" smtClean="0"/>
+              <a:t>, but it was one that had effect in </a:t>
+            </a:r>
+            <a:r>
+              <a:rPr lang="en-US" i="1" dirty="0" smtClean="0"/>
+              <a:t>24B-Gal4</a:t>
+            </a:r>
+            <a:r>
+              <a:rPr lang="en-US" dirty="0" smtClean="0"/>
+              <a:t> driven knockout</a:t>
+            </a:r>
           </a:p>
         </p:txBody>
       </p:sp>
@@ -4070,7 +4153,15 @@
           <a:p>
             <a:r>
               <a:rPr lang="en-US" dirty="0" smtClean="0"/>
-              <a:t>Knockout of Atg8a in Fly Muscles Shortens Lifespan</a:t>
+              <a:t>Knockout of </a:t>
+            </a:r>
+            <a:r>
+              <a:rPr lang="en-US" i="1" dirty="0" smtClean="0"/>
+              <a:t>Atg8a</a:t>
+            </a:r>
+            <a:r>
+              <a:rPr lang="en-US" dirty="0" smtClean="0"/>
+              <a:t> in Fly Muscles Shortens Lifespan</a:t>
             </a:r>
             <a:endParaRPr lang="en-US" dirty="0"/>
           </a:p>
@@ -4095,17 +4186,25 @@
           <a:p>
             <a:r>
               <a:rPr lang="en-US" dirty="0" smtClean="0"/>
-              <a:t>This is genetic impairment of autophagy in </a:t>
-            </a:r>
-            <a:r>
-              <a:rPr lang="en-US" smtClean="0"/>
-              <a:t>skeletal muscles</a:t>
-            </a:r>
-          </a:p>
-          <a:p>
-            <a:r>
-              <a:rPr lang="en-US" dirty="0" smtClean="0"/>
-              <a:t>Not Atg5 or Atg8b</a:t>
+              <a:t>This is genetic impairment of autophagy in skeletal muscles</a:t>
+            </a:r>
+          </a:p>
+          <a:p>
+            <a:r>
+              <a:rPr lang="en-US" dirty="0" smtClean="0"/>
+              <a:t>No effect for </a:t>
+            </a:r>
+            <a:r>
+              <a:rPr lang="en-US" i="1" dirty="0" smtClean="0"/>
+              <a:t>Atg5</a:t>
+            </a:r>
+            <a:r>
+              <a:rPr lang="en-US" dirty="0" smtClean="0"/>
+              <a:t> or </a:t>
+            </a:r>
+            <a:r>
+              <a:rPr lang="en-US" i="1" dirty="0" smtClean="0"/>
+              <a:t>Atg8b</a:t>
             </a:r>
           </a:p>
           <a:p>
@@ -4229,6 +4328,90 @@
       </p:par>
     </p:tnLst>
   </p:timing>
+</p:sld>
+</file>
+
+<file path=ppt/slides/slide8.xml><?xml version="1.0" encoding="utf-8"?>
+<p:sld xmlns:a="http://schemas.openxmlformats.org/drawingml/2006/main" xmlns:r="http://schemas.openxmlformats.org/officeDocument/2006/relationships" xmlns:p="http://schemas.openxmlformats.org/presentationml/2006/main">
+  <p:cSld>
+    <p:spTree>
+      <p:nvGrpSpPr>
+        <p:cNvPr id="1" name=""/>
+        <p:cNvGrpSpPr/>
+        <p:nvPr/>
+      </p:nvGrpSpPr>
+      <p:grpSpPr>
+        <a:xfrm>
+          <a:off x="0" y="0"/>
+          <a:ext cx="0" cy="0"/>
+          <a:chOff x="0" y="0"/>
+          <a:chExt cx="0" cy="0"/>
+        </a:xfrm>
+      </p:grpSpPr>
+      <p:sp>
+        <p:nvSpPr>
+          <p:cNvPr id="2" name="Title 1"/>
+          <p:cNvSpPr>
+            <a:spLocks noGrp="1"/>
+          </p:cNvSpPr>
+          <p:nvPr>
+            <p:ph type="title"/>
+          </p:nvPr>
+        </p:nvSpPr>
+        <p:spPr/>
+        <p:txBody>
+          <a:bodyPr/>
+          <a:lstStyle/>
+          <a:p>
+            <a:r>
+              <a:rPr lang="en-US" dirty="0" smtClean="0"/>
+              <a:t>Climbing Assay Data</a:t>
+            </a:r>
+            <a:endParaRPr lang="en-US" dirty="0"/>
+          </a:p>
+        </p:txBody>
+      </p:sp>
+      <p:sp>
+        <p:nvSpPr>
+          <p:cNvPr id="4" name="Content Placeholder 3"/>
+          <p:cNvSpPr>
+            <a:spLocks noGrp="1"/>
+          </p:cNvSpPr>
+          <p:nvPr>
+            <p:ph idx="1"/>
+          </p:nvPr>
+        </p:nvSpPr>
+        <p:spPr/>
+        <p:txBody>
+          <a:bodyPr/>
+          <a:lstStyle/>
+          <a:p>
+            <a:r>
+              <a:rPr lang="en-US" dirty="0" smtClean="0"/>
+              <a:t>Probably have this somewhere, the hypothesis would be that </a:t>
+            </a:r>
+            <a:r>
+              <a:rPr lang="en-US" dirty="0" err="1" smtClean="0"/>
+              <a:t>climibing</a:t>
+            </a:r>
+            <a:r>
+              <a:rPr lang="en-US" dirty="0" smtClean="0"/>
+              <a:t> ability is reduced as these flies age faster, but I need to find it</a:t>
+            </a:r>
+            <a:endParaRPr lang="en-US" dirty="0"/>
+          </a:p>
+        </p:txBody>
+      </p:sp>
+    </p:spTree>
+    <p:extLst>
+      <p:ext uri="{BB962C8B-B14F-4D97-AF65-F5344CB8AC3E}">
+        <p14:creationId xmlns:p14="http://schemas.microsoft.com/office/powerpoint/2010/main" val="121323792"/>
+      </p:ext>
+    </p:extLst>
+  </p:cSld>
+  <p:clrMapOvr>
+    <a:masterClrMapping/>
+  </p:clrMapOvr>
 </p:sld>
 </file>
 

</xml_diff>

<commit_message>
Wrote part of discussion
</commit_message>
<xml_diff>
--- a/Manuscripts/Muscle Tsc1 Aging Paper/Data Summary.pptx
+++ b/Manuscripts/Muscle Tsc1 Aging Paper/Data Summary.pptx
@@ -295,7 +295,7 @@
           <a:p>
             <a:fld id="{1DBAFFBE-1D8E-E243-8BC7-52F01614342D}" type="datetimeFigureOut">
               <a:rPr lang="en-US" smtClean="0"/>
-              <a:t>2/11/16</a:t>
+              <a:t>2/17/16</a:t>
             </a:fld>
             <a:endParaRPr lang="en-US"/>
           </a:p>
@@ -465,7 +465,7 @@
           <a:p>
             <a:fld id="{1DBAFFBE-1D8E-E243-8BC7-52F01614342D}" type="datetimeFigureOut">
               <a:rPr lang="en-US" smtClean="0"/>
-              <a:t>2/11/16</a:t>
+              <a:t>2/17/16</a:t>
             </a:fld>
             <a:endParaRPr lang="en-US"/>
           </a:p>
@@ -645,7 +645,7 @@
           <a:p>
             <a:fld id="{1DBAFFBE-1D8E-E243-8BC7-52F01614342D}" type="datetimeFigureOut">
               <a:rPr lang="en-US" smtClean="0"/>
-              <a:t>2/11/16</a:t>
+              <a:t>2/17/16</a:t>
             </a:fld>
             <a:endParaRPr lang="en-US"/>
           </a:p>
@@ -815,7 +815,7 @@
           <a:p>
             <a:fld id="{1DBAFFBE-1D8E-E243-8BC7-52F01614342D}" type="datetimeFigureOut">
               <a:rPr lang="en-US" smtClean="0"/>
-              <a:t>2/11/16</a:t>
+              <a:t>2/17/16</a:t>
             </a:fld>
             <a:endParaRPr lang="en-US"/>
           </a:p>
@@ -1061,7 +1061,7 @@
           <a:p>
             <a:fld id="{1DBAFFBE-1D8E-E243-8BC7-52F01614342D}" type="datetimeFigureOut">
               <a:rPr lang="en-US" smtClean="0"/>
-              <a:t>2/11/16</a:t>
+              <a:t>2/17/16</a:t>
             </a:fld>
             <a:endParaRPr lang="en-US"/>
           </a:p>
@@ -1349,7 +1349,7 @@
           <a:p>
             <a:fld id="{1DBAFFBE-1D8E-E243-8BC7-52F01614342D}" type="datetimeFigureOut">
               <a:rPr lang="en-US" smtClean="0"/>
-              <a:t>2/11/16</a:t>
+              <a:t>2/17/16</a:t>
             </a:fld>
             <a:endParaRPr lang="en-US"/>
           </a:p>
@@ -1771,7 +1771,7 @@
           <a:p>
             <a:fld id="{1DBAFFBE-1D8E-E243-8BC7-52F01614342D}" type="datetimeFigureOut">
               <a:rPr lang="en-US" smtClean="0"/>
-              <a:t>2/11/16</a:t>
+              <a:t>2/17/16</a:t>
             </a:fld>
             <a:endParaRPr lang="en-US"/>
           </a:p>
@@ -1889,7 +1889,7 @@
           <a:p>
             <a:fld id="{1DBAFFBE-1D8E-E243-8BC7-52F01614342D}" type="datetimeFigureOut">
               <a:rPr lang="en-US" smtClean="0"/>
-              <a:t>2/11/16</a:t>
+              <a:t>2/17/16</a:t>
             </a:fld>
             <a:endParaRPr lang="en-US"/>
           </a:p>
@@ -1984,7 +1984,7 @@
           <a:p>
             <a:fld id="{1DBAFFBE-1D8E-E243-8BC7-52F01614342D}" type="datetimeFigureOut">
               <a:rPr lang="en-US" smtClean="0"/>
-              <a:t>2/11/16</a:t>
+              <a:t>2/17/16</a:t>
             </a:fld>
             <a:endParaRPr lang="en-US"/>
           </a:p>
@@ -2261,7 +2261,7 @@
           <a:p>
             <a:fld id="{1DBAFFBE-1D8E-E243-8BC7-52F01614342D}" type="datetimeFigureOut">
               <a:rPr lang="en-US" smtClean="0"/>
-              <a:t>2/11/16</a:t>
+              <a:t>2/17/16</a:t>
             </a:fld>
             <a:endParaRPr lang="en-US"/>
           </a:p>
@@ -2514,7 +2514,7 @@
           <a:p>
             <a:fld id="{1DBAFFBE-1D8E-E243-8BC7-52F01614342D}" type="datetimeFigureOut">
               <a:rPr lang="en-US" smtClean="0"/>
-              <a:t>2/11/16</a:t>
+              <a:t>2/17/16</a:t>
             </a:fld>
             <a:endParaRPr lang="en-US"/>
           </a:p>
@@ -2727,7 +2727,7 @@
           <a:p>
             <a:fld id="{1DBAFFBE-1D8E-E243-8BC7-52F01614342D}" type="datetimeFigureOut">
               <a:rPr lang="en-US" smtClean="0"/>
-              <a:t>2/11/16</a:t>
+              <a:t>2/17/16</a:t>
             </a:fld>
             <a:endParaRPr lang="en-US"/>
           </a:p>
@@ -3121,7 +3121,15 @@
           <a:p>
             <a:r>
               <a:rPr lang="en-US" dirty="0" smtClean="0"/>
-              <a:t>Activation of mTORC1 and Suppression of Autophagy in Muscle Reduces Lifespan in Mice and Flies</a:t>
+              <a:t>Activation of mTORC1 and Suppression of Autophagy in </a:t>
+            </a:r>
+            <a:r>
+              <a:rPr lang="en-US" dirty="0" smtClean="0"/>
+              <a:t>Muscle Tissue Shortens </a:t>
+            </a:r>
+            <a:r>
+              <a:rPr lang="en-US" dirty="0" smtClean="0"/>
+              <a:t>Lifespan in Mice and Flies</a:t>
             </a:r>
             <a:endParaRPr lang="en-US" dirty="0"/>
           </a:p>
@@ -3474,19 +3482,7 @@
             </a:r>
             <a:r>
               <a:rPr lang="en-US" dirty="0" smtClean="0"/>
-              <a:t> in Fly </a:t>
-            </a:r>
-            <a:r>
-              <a:rPr lang="en-US" dirty="0" smtClean="0"/>
-              <a:t>Flight </a:t>
-            </a:r>
-            <a:r>
-              <a:rPr lang="en-US" dirty="0" smtClean="0"/>
-              <a:t>Muscles </a:t>
-            </a:r>
-            <a:r>
-              <a:rPr lang="en-US" dirty="0" smtClean="0"/>
-              <a:t>Shortens Lifespan</a:t>
+              <a:t> in Fly Flight Muscles Shortens Lifespan</a:t>
             </a:r>
             <a:endParaRPr lang="en-US" dirty="0"/>
           </a:p>
@@ -3517,11 +3513,7 @@
           <a:p>
             <a:r>
               <a:rPr lang="en-US" dirty="0" smtClean="0"/>
-              <a:t>24B </a:t>
-            </a:r>
-            <a:r>
-              <a:rPr lang="en-US" dirty="0" smtClean="0"/>
-              <a:t>Driver</a:t>
+              <a:t>24B Driver</a:t>
             </a:r>
           </a:p>
           <a:p>
@@ -3539,11 +3531,7 @@
             </a:r>
             <a:r>
               <a:rPr lang="en-US" i="1" dirty="0" smtClean="0"/>
-              <a:t>Tsc</a:t>
-            </a:r>
-            <a:r>
-              <a:rPr lang="en-US" i="1" dirty="0" smtClean="0"/>
-              <a:t>1</a:t>
+              <a:t>Tsc1</a:t>
             </a:r>
             <a:r>
               <a:rPr lang="en-US" dirty="0" smtClean="0"/>
@@ -3599,7 +3587,6 @@
               <a:rPr lang="en-US" dirty="0" smtClean="0"/>
               <a:t> probably nonfunctional (no phenotype with SSI assay)</a:t>
             </a:r>
-            <a:endParaRPr lang="en-US" dirty="0" smtClean="0"/>
           </a:p>
           <a:p>
             <a:pPr marL="0" indent="0">

</xml_diff>

<commit_message>
Added more details to the discussion
</commit_message>
<xml_diff>
--- a/Manuscripts/Muscle Tsc1 Aging Paper/Data Summary.pptx
+++ b/Manuscripts/Muscle Tsc1 Aging Paper/Data Summary.pptx
@@ -111,6 +111,22 @@
       </a:defRPr>
     </a:lvl9pPr>
   </p:defaultTextStyle>
+  <p:extLst>
+    <p:ext uri="{EFAFB233-063F-42B5-8137-9DF3F51BA10A}">
+      <p15:sldGuideLst xmlns:p15="http://schemas.microsoft.com/office/powerpoint/2012/main">
+        <p15:guide id="1" orient="horz" pos="2160">
+          <p15:clr>
+            <a:srgbClr val="A4A3A4"/>
+          </p15:clr>
+        </p15:guide>
+        <p15:guide id="2" pos="2880">
+          <p15:clr>
+            <a:srgbClr val="A4A3A4"/>
+          </p15:clr>
+        </p15:guide>
+      </p15:sldGuideLst>
+    </p:ext>
+  </p:extLst>
 </p:presentation>
 </file>
 
@@ -295,7 +311,7 @@
           <a:p>
             <a:fld id="{1DBAFFBE-1D8E-E243-8BC7-52F01614342D}" type="datetimeFigureOut">
               <a:rPr lang="en-US" smtClean="0"/>
-              <a:t>2/17/16</a:t>
+              <a:t>10/23/16</a:t>
             </a:fld>
             <a:endParaRPr lang="en-US"/>
           </a:p>
@@ -465,7 +481,7 @@
           <a:p>
             <a:fld id="{1DBAFFBE-1D8E-E243-8BC7-52F01614342D}" type="datetimeFigureOut">
               <a:rPr lang="en-US" smtClean="0"/>
-              <a:t>2/17/16</a:t>
+              <a:t>10/23/16</a:t>
             </a:fld>
             <a:endParaRPr lang="en-US"/>
           </a:p>
@@ -645,7 +661,7 @@
           <a:p>
             <a:fld id="{1DBAFFBE-1D8E-E243-8BC7-52F01614342D}" type="datetimeFigureOut">
               <a:rPr lang="en-US" smtClean="0"/>
-              <a:t>2/17/16</a:t>
+              <a:t>10/23/16</a:t>
             </a:fld>
             <a:endParaRPr lang="en-US"/>
           </a:p>
@@ -815,7 +831,7 @@
           <a:p>
             <a:fld id="{1DBAFFBE-1D8E-E243-8BC7-52F01614342D}" type="datetimeFigureOut">
               <a:rPr lang="en-US" smtClean="0"/>
-              <a:t>2/17/16</a:t>
+              <a:t>10/23/16</a:t>
             </a:fld>
             <a:endParaRPr lang="en-US"/>
           </a:p>
@@ -1061,7 +1077,7 @@
           <a:p>
             <a:fld id="{1DBAFFBE-1D8E-E243-8BC7-52F01614342D}" type="datetimeFigureOut">
               <a:rPr lang="en-US" smtClean="0"/>
-              <a:t>2/17/16</a:t>
+              <a:t>10/23/16</a:t>
             </a:fld>
             <a:endParaRPr lang="en-US"/>
           </a:p>
@@ -1349,7 +1365,7 @@
           <a:p>
             <a:fld id="{1DBAFFBE-1D8E-E243-8BC7-52F01614342D}" type="datetimeFigureOut">
               <a:rPr lang="en-US" smtClean="0"/>
-              <a:t>2/17/16</a:t>
+              <a:t>10/23/16</a:t>
             </a:fld>
             <a:endParaRPr lang="en-US"/>
           </a:p>
@@ -1771,7 +1787,7 @@
           <a:p>
             <a:fld id="{1DBAFFBE-1D8E-E243-8BC7-52F01614342D}" type="datetimeFigureOut">
               <a:rPr lang="en-US" smtClean="0"/>
-              <a:t>2/17/16</a:t>
+              <a:t>10/23/16</a:t>
             </a:fld>
             <a:endParaRPr lang="en-US"/>
           </a:p>
@@ -1889,7 +1905,7 @@
           <a:p>
             <a:fld id="{1DBAFFBE-1D8E-E243-8BC7-52F01614342D}" type="datetimeFigureOut">
               <a:rPr lang="en-US" smtClean="0"/>
-              <a:t>2/17/16</a:t>
+              <a:t>10/23/16</a:t>
             </a:fld>
             <a:endParaRPr lang="en-US"/>
           </a:p>
@@ -1984,7 +2000,7 @@
           <a:p>
             <a:fld id="{1DBAFFBE-1D8E-E243-8BC7-52F01614342D}" type="datetimeFigureOut">
               <a:rPr lang="en-US" smtClean="0"/>
-              <a:t>2/17/16</a:t>
+              <a:t>10/23/16</a:t>
             </a:fld>
             <a:endParaRPr lang="en-US"/>
           </a:p>
@@ -2261,7 +2277,7 @@
           <a:p>
             <a:fld id="{1DBAFFBE-1D8E-E243-8BC7-52F01614342D}" type="datetimeFigureOut">
               <a:rPr lang="en-US" smtClean="0"/>
-              <a:t>2/17/16</a:t>
+              <a:t>10/23/16</a:t>
             </a:fld>
             <a:endParaRPr lang="en-US"/>
           </a:p>
@@ -2514,7 +2530,7 @@
           <a:p>
             <a:fld id="{1DBAFFBE-1D8E-E243-8BC7-52F01614342D}" type="datetimeFigureOut">
               <a:rPr lang="en-US" smtClean="0"/>
-              <a:t>2/17/16</a:t>
+              <a:t>10/23/16</a:t>
             </a:fld>
             <a:endParaRPr lang="en-US"/>
           </a:p>
@@ -2727,7 +2743,7 @@
           <a:p>
             <a:fld id="{1DBAFFBE-1D8E-E243-8BC7-52F01614342D}" type="datetimeFigureOut">
               <a:rPr lang="en-US" smtClean="0"/>
-              <a:t>2/17/16</a:t>
+              <a:t>10/23/16</a:t>
             </a:fld>
             <a:endParaRPr lang="en-US"/>
           </a:p>
@@ -3121,15 +3137,7 @@
           <a:p>
             <a:r>
               <a:rPr lang="en-US" dirty="0" smtClean="0"/>
-              <a:t>Activation of mTORC1 and Suppression of Autophagy in </a:t>
-            </a:r>
-            <a:r>
-              <a:rPr lang="en-US" dirty="0" smtClean="0"/>
-              <a:t>Muscle Tissue Shortens </a:t>
-            </a:r>
-            <a:r>
-              <a:rPr lang="en-US" dirty="0" smtClean="0"/>
-              <a:t>Lifespan in Mice and Flies</a:t>
+              <a:t>Activation of mTORC1 and Suppression of Autophagy in Muscle Tissue Shortens Lifespan in Mice and Flies</a:t>
             </a:r>
             <a:endParaRPr lang="en-US" dirty="0"/>
           </a:p>
@@ -3669,7 +3677,7 @@
   <p:timing>
     <p:tnLst>
       <p:par>
-        <p:cTn xmlns:p14="http://schemas.microsoft.com/office/powerpoint/2010/main" id="1" dur="indefinite" restart="never" nodeType="tmRoot"/>
+        <p:cTn id="1" dur="indefinite" restart="never" nodeType="tmRoot"/>
       </p:par>
     </p:tnLst>
   </p:timing>
@@ -4097,7 +4105,7 @@
   <p:timing>
     <p:tnLst>
       <p:par>
-        <p:cTn xmlns:p14="http://schemas.microsoft.com/office/powerpoint/2010/main" id="1" dur="indefinite" restart="never" nodeType="tmRoot"/>
+        <p:cTn id="1" dur="indefinite" restart="never" nodeType="tmRoot"/>
       </p:par>
     </p:tnLst>
   </p:timing>
@@ -4311,7 +4319,7 @@
   <p:timing>
     <p:tnLst>
       <p:par>
-        <p:cTn xmlns:p14="http://schemas.microsoft.com/office/powerpoint/2010/main" id="1" dur="indefinite" restart="never" nodeType="tmRoot"/>
+        <p:cTn id="1" dur="indefinite" restart="never" nodeType="tmRoot"/>
       </p:par>
     </p:tnLst>
   </p:timing>
@@ -4378,12 +4386,12 @@
               <a:t>Probably have this somewhere, the hypothesis would be that </a:t>
             </a:r>
             <a:r>
-              <a:rPr lang="en-US" dirty="0" err="1" smtClean="0"/>
-              <a:t>climibing</a:t>
-            </a:r>
-            <a:r>
-              <a:rPr lang="en-US" dirty="0" smtClean="0"/>
-              <a:t> ability is reduced as these flies age faster, but I need to find it</a:t>
+              <a:rPr lang="en-US" dirty="0" smtClean="0"/>
+              <a:t>climbing </a:t>
+            </a:r>
+            <a:r>
+              <a:rPr lang="en-US" dirty="0" smtClean="0"/>
+              <a:t>ability is reduced as these flies age faster, but I need to find it</a:t>
             </a:r>
             <a:endParaRPr lang="en-US" dirty="0"/>
           </a:p>

</xml_diff>

<commit_message>
Added notes to powerpoint
</commit_message>
<xml_diff>
--- a/Manuscripts/Muscle Tsc1 Aging Paper/Data Summary.pptx
+++ b/Manuscripts/Muscle Tsc1 Aging Paper/Data Summary.pptx
@@ -4383,15 +4383,7 @@
           <a:p>
             <a:r>
               <a:rPr lang="en-US" dirty="0" smtClean="0"/>
-              <a:t>Probably have this somewhere, the hypothesis would be that </a:t>
-            </a:r>
-            <a:r>
-              <a:rPr lang="en-US" dirty="0" smtClean="0"/>
-              <a:t>climbing </a:t>
-            </a:r>
-            <a:r>
-              <a:rPr lang="en-US" dirty="0" smtClean="0"/>
-              <a:t>ability is reduced as these flies age faster, but I need to find it</a:t>
+              <a:t>Probably have this somewhere, the hypothesis would be that climbing ability is reduced as these flies age faster, but I need to find it</a:t>
             </a:r>
             <a:endParaRPr lang="en-US" dirty="0"/>
           </a:p>

</xml_diff>